<commit_message>
Adding example readme file
</commit_message>
<xml_diff>
--- a/slides/KeyStone PCI Express.pptx
+++ b/slides/KeyStone PCI Express.pptx
@@ -5,7 +5,7 @@
     <p:sldMasterId id="2147483725" r:id="rId1"/>
   </p:sldMasterIdLst>
   <p:notesMasterIdLst>
-    <p:notesMasterId r:id="rId24"/>
+    <p:notesMasterId r:id="rId28"/>
   </p:notesMasterIdLst>
   <p:sldIdLst>
     <p:sldId id="259" r:id="rId2"/>
@@ -29,12 +29,16 @@
     <p:sldId id="321" r:id="rId20"/>
     <p:sldId id="322" r:id="rId21"/>
     <p:sldId id="323" r:id="rId22"/>
-    <p:sldId id="327" r:id="rId23"/>
+    <p:sldId id="333" r:id="rId23"/>
+    <p:sldId id="334" r:id="rId24"/>
+    <p:sldId id="335" r:id="rId25"/>
+    <p:sldId id="336" r:id="rId26"/>
+    <p:sldId id="327" r:id="rId27"/>
   </p:sldIdLst>
   <p:sldSz cx="9144000" cy="6858000" type="screen4x3"/>
   <p:notesSz cx="7315200" cy="9601200"/>
   <p:custDataLst>
-    <p:tags r:id="rId25"/>
+    <p:tags r:id="rId29"/>
   </p:custDataLst>
   <p:defaultTextStyle>
     <a:defPPr>
@@ -1764,6 +1768,334 @@
       </p:grpSpPr>
       <p:sp>
         <p:nvSpPr>
+          <p:cNvPr id="2" name="Slide Image Placeholder 1"/>
+          <p:cNvSpPr>
+            <a:spLocks noGrp="1" noRot="1" noChangeAspect="1"/>
+          </p:cNvSpPr>
+          <p:nvPr>
+            <p:ph type="sldImg"/>
+          </p:nvPr>
+        </p:nvSpPr>
+        <p:spPr/>
+      </p:sp>
+      <p:sp>
+        <p:nvSpPr>
+          <p:cNvPr id="3" name="Notes Placeholder 2"/>
+          <p:cNvSpPr>
+            <a:spLocks noGrp="1"/>
+          </p:cNvSpPr>
+          <p:nvPr>
+            <p:ph type="body" idx="1"/>
+          </p:nvPr>
+        </p:nvSpPr>
+        <p:spPr/>
+        <p:txBody>
+          <a:bodyPr>
+            <a:normAutofit/>
+          </a:bodyPr>
+          <a:lstStyle/>
+          <a:p>
+            <a:endParaRPr lang="en-US" dirty="0"/>
+          </a:p>
+        </p:txBody>
+      </p:sp>
+      <p:sp>
+        <p:nvSpPr>
+          <p:cNvPr id="4" name="Slide Number Placeholder 3"/>
+          <p:cNvSpPr>
+            <a:spLocks noGrp="1"/>
+          </p:cNvSpPr>
+          <p:nvPr>
+            <p:ph type="sldNum" sz="quarter" idx="10"/>
+          </p:nvPr>
+        </p:nvSpPr>
+        <p:spPr/>
+        <p:txBody>
+          <a:bodyPr/>
+          <a:lstStyle/>
+          <a:p>
+            <a:fld id="{7D85CFDE-532E-417C-A2AD-0C5C8E337136}" type="slidenum">
+              <a:rPr lang="en-US" smtClean="0"/>
+              <a:pPr/>
+              <a:t>22</a:t>
+            </a:fld>
+            <a:endParaRPr lang="en-US" dirty="0"/>
+          </a:p>
+        </p:txBody>
+      </p:sp>
+    </p:spTree>
+  </p:cSld>
+  <p:clrMapOvr>
+    <a:masterClrMapping/>
+  </p:clrMapOvr>
+</p:notes>
+</file>
+
+<file path=ppt/notesSlides/notesSlide23.xml><?xml version="1.0" encoding="utf-8"?>
+<p:notes xmlns:a="http://schemas.openxmlformats.org/drawingml/2006/main" xmlns:r="http://schemas.openxmlformats.org/officeDocument/2006/relationships" xmlns:p="http://schemas.openxmlformats.org/presentationml/2006/main">
+  <p:cSld>
+    <p:spTree>
+      <p:nvGrpSpPr>
+        <p:cNvPr id="1" name=""/>
+        <p:cNvGrpSpPr/>
+        <p:nvPr/>
+      </p:nvGrpSpPr>
+      <p:grpSpPr>
+        <a:xfrm>
+          <a:off x="0" y="0"/>
+          <a:ext cx="0" cy="0"/>
+          <a:chOff x="0" y="0"/>
+          <a:chExt cx="0" cy="0"/>
+        </a:xfrm>
+      </p:grpSpPr>
+      <p:sp>
+        <p:nvSpPr>
+          <p:cNvPr id="2" name="Slide Image Placeholder 1"/>
+          <p:cNvSpPr>
+            <a:spLocks noGrp="1" noRot="1" noChangeAspect="1"/>
+          </p:cNvSpPr>
+          <p:nvPr>
+            <p:ph type="sldImg"/>
+          </p:nvPr>
+        </p:nvSpPr>
+        <p:spPr/>
+      </p:sp>
+      <p:sp>
+        <p:nvSpPr>
+          <p:cNvPr id="3" name="Notes Placeholder 2"/>
+          <p:cNvSpPr>
+            <a:spLocks noGrp="1"/>
+          </p:cNvSpPr>
+          <p:nvPr>
+            <p:ph type="body" idx="1"/>
+          </p:nvPr>
+        </p:nvSpPr>
+        <p:spPr/>
+        <p:txBody>
+          <a:bodyPr>
+            <a:normAutofit/>
+          </a:bodyPr>
+          <a:lstStyle/>
+          <a:p>
+            <a:endParaRPr lang="en-US" dirty="0"/>
+          </a:p>
+        </p:txBody>
+      </p:sp>
+      <p:sp>
+        <p:nvSpPr>
+          <p:cNvPr id="4" name="Slide Number Placeholder 3"/>
+          <p:cNvSpPr>
+            <a:spLocks noGrp="1"/>
+          </p:cNvSpPr>
+          <p:nvPr>
+            <p:ph type="sldNum" sz="quarter" idx="10"/>
+          </p:nvPr>
+        </p:nvSpPr>
+        <p:spPr/>
+        <p:txBody>
+          <a:bodyPr/>
+          <a:lstStyle/>
+          <a:p>
+            <a:fld id="{7D85CFDE-532E-417C-A2AD-0C5C8E337136}" type="slidenum">
+              <a:rPr lang="en-US" smtClean="0"/>
+              <a:pPr/>
+              <a:t>23</a:t>
+            </a:fld>
+            <a:endParaRPr lang="en-US" dirty="0"/>
+          </a:p>
+        </p:txBody>
+      </p:sp>
+    </p:spTree>
+  </p:cSld>
+  <p:clrMapOvr>
+    <a:masterClrMapping/>
+  </p:clrMapOvr>
+</p:notes>
+</file>
+
+<file path=ppt/notesSlides/notesSlide24.xml><?xml version="1.0" encoding="utf-8"?>
+<p:notes xmlns:a="http://schemas.openxmlformats.org/drawingml/2006/main" xmlns:r="http://schemas.openxmlformats.org/officeDocument/2006/relationships" xmlns:p="http://schemas.openxmlformats.org/presentationml/2006/main">
+  <p:cSld>
+    <p:spTree>
+      <p:nvGrpSpPr>
+        <p:cNvPr id="1" name=""/>
+        <p:cNvGrpSpPr/>
+        <p:nvPr/>
+      </p:nvGrpSpPr>
+      <p:grpSpPr>
+        <a:xfrm>
+          <a:off x="0" y="0"/>
+          <a:ext cx="0" cy="0"/>
+          <a:chOff x="0" y="0"/>
+          <a:chExt cx="0" cy="0"/>
+        </a:xfrm>
+      </p:grpSpPr>
+      <p:sp>
+        <p:nvSpPr>
+          <p:cNvPr id="2" name="Slide Image Placeholder 1"/>
+          <p:cNvSpPr>
+            <a:spLocks noGrp="1" noRot="1" noChangeAspect="1"/>
+          </p:cNvSpPr>
+          <p:nvPr>
+            <p:ph type="sldImg"/>
+          </p:nvPr>
+        </p:nvSpPr>
+        <p:spPr/>
+      </p:sp>
+      <p:sp>
+        <p:nvSpPr>
+          <p:cNvPr id="3" name="Notes Placeholder 2"/>
+          <p:cNvSpPr>
+            <a:spLocks noGrp="1"/>
+          </p:cNvSpPr>
+          <p:nvPr>
+            <p:ph type="body" idx="1"/>
+          </p:nvPr>
+        </p:nvSpPr>
+        <p:spPr/>
+        <p:txBody>
+          <a:bodyPr>
+            <a:normAutofit/>
+          </a:bodyPr>
+          <a:lstStyle/>
+          <a:p>
+            <a:endParaRPr lang="en-US" dirty="0"/>
+          </a:p>
+        </p:txBody>
+      </p:sp>
+      <p:sp>
+        <p:nvSpPr>
+          <p:cNvPr id="4" name="Slide Number Placeholder 3"/>
+          <p:cNvSpPr>
+            <a:spLocks noGrp="1"/>
+          </p:cNvSpPr>
+          <p:nvPr>
+            <p:ph type="sldNum" sz="quarter" idx="10"/>
+          </p:nvPr>
+        </p:nvSpPr>
+        <p:spPr/>
+        <p:txBody>
+          <a:bodyPr/>
+          <a:lstStyle/>
+          <a:p>
+            <a:fld id="{7D85CFDE-532E-417C-A2AD-0C5C8E337136}" type="slidenum">
+              <a:rPr lang="en-US" smtClean="0"/>
+              <a:pPr/>
+              <a:t>24</a:t>
+            </a:fld>
+            <a:endParaRPr lang="en-US" dirty="0"/>
+          </a:p>
+        </p:txBody>
+      </p:sp>
+    </p:spTree>
+  </p:cSld>
+  <p:clrMapOvr>
+    <a:masterClrMapping/>
+  </p:clrMapOvr>
+</p:notes>
+</file>
+
+<file path=ppt/notesSlides/notesSlide25.xml><?xml version="1.0" encoding="utf-8"?>
+<p:notes xmlns:a="http://schemas.openxmlformats.org/drawingml/2006/main" xmlns:r="http://schemas.openxmlformats.org/officeDocument/2006/relationships" xmlns:p="http://schemas.openxmlformats.org/presentationml/2006/main">
+  <p:cSld>
+    <p:spTree>
+      <p:nvGrpSpPr>
+        <p:cNvPr id="1" name=""/>
+        <p:cNvGrpSpPr/>
+        <p:nvPr/>
+      </p:nvGrpSpPr>
+      <p:grpSpPr>
+        <a:xfrm>
+          <a:off x="0" y="0"/>
+          <a:ext cx="0" cy="0"/>
+          <a:chOff x="0" y="0"/>
+          <a:chExt cx="0" cy="0"/>
+        </a:xfrm>
+      </p:grpSpPr>
+      <p:sp>
+        <p:nvSpPr>
+          <p:cNvPr id="2" name="Slide Image Placeholder 1"/>
+          <p:cNvSpPr>
+            <a:spLocks noGrp="1" noRot="1" noChangeAspect="1"/>
+          </p:cNvSpPr>
+          <p:nvPr>
+            <p:ph type="sldImg"/>
+          </p:nvPr>
+        </p:nvSpPr>
+        <p:spPr/>
+      </p:sp>
+      <p:sp>
+        <p:nvSpPr>
+          <p:cNvPr id="3" name="Notes Placeholder 2"/>
+          <p:cNvSpPr>
+            <a:spLocks noGrp="1"/>
+          </p:cNvSpPr>
+          <p:nvPr>
+            <p:ph type="body" idx="1"/>
+          </p:nvPr>
+        </p:nvSpPr>
+        <p:spPr/>
+        <p:txBody>
+          <a:bodyPr>
+            <a:normAutofit/>
+          </a:bodyPr>
+          <a:lstStyle/>
+          <a:p>
+            <a:endParaRPr lang="en-US" dirty="0"/>
+          </a:p>
+        </p:txBody>
+      </p:sp>
+      <p:sp>
+        <p:nvSpPr>
+          <p:cNvPr id="4" name="Slide Number Placeholder 3"/>
+          <p:cNvSpPr>
+            <a:spLocks noGrp="1"/>
+          </p:cNvSpPr>
+          <p:nvPr>
+            <p:ph type="sldNum" sz="quarter" idx="10"/>
+          </p:nvPr>
+        </p:nvSpPr>
+        <p:spPr/>
+        <p:txBody>
+          <a:bodyPr/>
+          <a:lstStyle/>
+          <a:p>
+            <a:fld id="{7D85CFDE-532E-417C-A2AD-0C5C8E337136}" type="slidenum">
+              <a:rPr lang="en-US" smtClean="0"/>
+              <a:pPr/>
+              <a:t>25</a:t>
+            </a:fld>
+            <a:endParaRPr lang="en-US" dirty="0"/>
+          </a:p>
+        </p:txBody>
+      </p:sp>
+    </p:spTree>
+  </p:cSld>
+  <p:clrMapOvr>
+    <a:masterClrMapping/>
+  </p:clrMapOvr>
+</p:notes>
+</file>
+
+<file path=ppt/notesSlides/notesSlide26.xml><?xml version="1.0" encoding="utf-8"?>
+<p:notes xmlns:a="http://schemas.openxmlformats.org/drawingml/2006/main" xmlns:r="http://schemas.openxmlformats.org/officeDocument/2006/relationships" xmlns:p="http://schemas.openxmlformats.org/presentationml/2006/main">
+  <p:cSld>
+    <p:spTree>
+      <p:nvGrpSpPr>
+        <p:cNvPr id="1" name=""/>
+        <p:cNvGrpSpPr/>
+        <p:nvPr/>
+      </p:nvGrpSpPr>
+      <p:grpSpPr>
+        <a:xfrm>
+          <a:off x="0" y="0"/>
+          <a:ext cx="0" cy="0"/>
+          <a:chOff x="0" y="0"/>
+          <a:chExt cx="0" cy="0"/>
+        </a:xfrm>
+      </p:grpSpPr>
+      <p:sp>
+        <p:nvSpPr>
           <p:cNvPr id="171010" name="Slide Image Placeholder 1"/>
           <p:cNvSpPr>
             <a:spLocks noGrp="1" noRot="1" noChangeAspect="1" noTextEdit="1"/>
@@ -1829,7 +2161,7 @@
                 <a:latin typeface="Arial" pitchFamily="34" charset="0"/>
               </a:rPr>
               <a:pPr defTabSz="943567"/>
-              <a:t>22</a:t>
+              <a:t>26</a:t>
             </a:fld>
             <a:endParaRPr lang="en-US" dirty="0" smtClean="0">
               <a:solidFill>
@@ -6206,21 +6538,8 @@
             <a:pPr lvl="1"/>
             <a:r>
               <a:rPr lang="en-US" sz="2000" dirty="0" smtClean="0"/>
-              <a:t>IB_BAR Inbound Translation Match Register </a:t>
+              <a:t>IB_BAR Inbound Translation Match Register (write the  MASK into IB_BAR, read gives the BAR set number)</a:t>
             </a:r>
-            <a:r>
-              <a:rPr lang="en-US" sz="2000" dirty="0" smtClean="0"/>
-              <a:t>(write </a:t>
-            </a:r>
-            <a:r>
-              <a:rPr lang="en-US" sz="2000" dirty="0" smtClean="0"/>
-              <a:t>the  MASK </a:t>
-            </a:r>
-            <a:r>
-              <a:rPr lang="en-US" sz="2000" dirty="0" smtClean="0"/>
-              <a:t>into IB_BAR, read gives the BAR set number)</a:t>
-            </a:r>
-            <a:endParaRPr lang="en-US" sz="2000" dirty="0" smtClean="0"/>
           </a:p>
           <a:p>
             <a:pPr lvl="1"/>
@@ -6735,13 +7054,7 @@
               <a:rPr lang="en-US" altLang="zh-CN" dirty="0" smtClean="0">
                 <a:ea typeface="宋体" charset="-122"/>
               </a:rPr>
-              <a:t>PCIe </a:t>
-            </a:r>
-            <a:r>
-              <a:rPr lang="en-US" altLang="zh-CN" dirty="0" smtClean="0">
-                <a:ea typeface="宋体" charset="-122"/>
-              </a:rPr>
-              <a:t>Demo </a:t>
+              <a:t>PCIe Demo </a:t>
             </a:r>
             <a:endParaRPr lang="en-US" altLang="zh-CN" dirty="0">
               <a:ea typeface="宋体" charset="-122"/>
@@ -7218,13 +7531,7 @@
               <a:rPr lang="en-US" altLang="zh-CN" dirty="0" smtClean="0">
                 <a:ea typeface="宋体" charset="-122"/>
               </a:rPr>
-              <a:t>PCIe </a:t>
-            </a:r>
-            <a:r>
-              <a:rPr lang="en-US" altLang="zh-CN" dirty="0" smtClean="0">
-                <a:ea typeface="宋体" charset="-122"/>
-              </a:rPr>
-              <a:t>Demo </a:t>
+              <a:t>PCIe Demo </a:t>
             </a:r>
             <a:endParaRPr lang="en-US" altLang="zh-CN" dirty="0">
               <a:ea typeface="宋体" charset="-122"/>
@@ -7400,7 +7707,17 @@
           <a:p>
             <a:r>
               <a:rPr lang="en-US" sz="2400" dirty="0" smtClean="0"/>
-              <a:t>C:\ti\pdk_C6678_xx_yy\packages\ti\drv\pcie\example\sample</a:t>
+              <a:t>C:\</a:t>
+            </a:r>
+            <a:r>
+              <a:rPr lang="en-US" sz="2400" dirty="0" smtClean="0"/>
+              <a:t>ti\pdk_C6678_xx_yy\packages\ti\drv\pcie\example\sample</a:t>
+            </a:r>
+          </a:p>
+          <a:p>
+            <a:r>
+              <a:rPr lang="en-US" sz="2400" dirty="0" smtClean="0"/>
+              <a:t>Example instructions are in the readme file and in the next slides</a:t>
             </a:r>
             <a:endParaRPr lang="en-US" sz="2400" dirty="0"/>
           </a:p>
@@ -7415,6 +7732,650 @@
 </file>
 
 <file path=ppt/slides/slide22.xml><?xml version="1.0" encoding="utf-8"?>
+<p:sld xmlns:a="http://schemas.openxmlformats.org/drawingml/2006/main" xmlns:r="http://schemas.openxmlformats.org/officeDocument/2006/relationships" xmlns:p="http://schemas.openxmlformats.org/presentationml/2006/main">
+  <p:cSld>
+    <p:spTree>
+      <p:nvGrpSpPr>
+        <p:cNvPr id="1" name=""/>
+        <p:cNvGrpSpPr/>
+        <p:nvPr/>
+      </p:nvGrpSpPr>
+      <p:grpSpPr>
+        <a:xfrm>
+          <a:off x="0" y="0"/>
+          <a:ext cx="0" cy="0"/>
+          <a:chOff x="0" y="0"/>
+          <a:chExt cx="0" cy="0"/>
+        </a:xfrm>
+      </p:grpSpPr>
+      <p:sp>
+        <p:nvSpPr>
+          <p:cNvPr id="266242" name="Rectangle 2"/>
+          <p:cNvSpPr>
+            <a:spLocks noGrp="1" noChangeArrowheads="1"/>
+          </p:cNvSpPr>
+          <p:nvPr>
+            <p:ph type="title"/>
+          </p:nvPr>
+        </p:nvSpPr>
+        <p:spPr/>
+        <p:txBody>
+          <a:bodyPr/>
+          <a:lstStyle/>
+          <a:p>
+            <a:r>
+              <a:rPr lang="en-US" dirty="0" smtClean="0"/>
+              <a:t>Demo</a:t>
+            </a:r>
+            <a:endParaRPr lang="en-US" dirty="0"/>
+          </a:p>
+        </p:txBody>
+      </p:sp>
+      <p:sp>
+        <p:nvSpPr>
+          <p:cNvPr id="7" name="Rectangle 6"/>
+          <p:cNvSpPr/>
+          <p:nvPr/>
+        </p:nvSpPr>
+        <p:spPr>
+          <a:xfrm>
+            <a:off x="402336" y="1563624"/>
+            <a:ext cx="8010144" cy="4708981"/>
+          </a:xfrm>
+          <a:prstGeom prst="rect">
+            <a:avLst/>
+          </a:prstGeom>
+        </p:spPr>
+        <p:txBody>
+          <a:bodyPr wrap="square">
+            <a:spAutoFit/>
+          </a:bodyPr>
+          <a:lstStyle/>
+          <a:p>
+            <a:r>
+              <a:rPr lang="en-US" sz="1200" dirty="0" smtClean="0"/>
+              <a:t> ******************************************************************************</a:t>
+            </a:r>
+          </a:p>
+          <a:p>
+            <a:r>
+              <a:rPr lang="en-US" sz="1200" dirty="0" smtClean="0"/>
+              <a:t> * FILE PURPOSE: Readme File for the PCIE Example Project</a:t>
+            </a:r>
+          </a:p>
+          <a:p>
+            <a:r>
+              <a:rPr lang="en-US" sz="1200" dirty="0" smtClean="0"/>
+              <a:t> ******************************************************************************</a:t>
+            </a:r>
+          </a:p>
+          <a:p>
+            <a:r>
+              <a:rPr lang="en-US" sz="1200" dirty="0" smtClean="0"/>
+              <a:t> * FILE NAME: Readme.txt</a:t>
+            </a:r>
+          </a:p>
+          <a:p>
+            <a:r>
+              <a:rPr lang="en-US" sz="1200" dirty="0" smtClean="0"/>
+              <a:t> * Copyright (C) 2011, Texas Instruments, Inc.</a:t>
+            </a:r>
+          </a:p>
+          <a:p>
+            <a:r>
+              <a:rPr lang="en-US" sz="1200" dirty="0" smtClean="0"/>
+              <a:t> *****************************************************************************</a:t>
+            </a:r>
+          </a:p>
+          <a:p>
+            <a:endParaRPr lang="en-US" sz="1200" dirty="0" smtClean="0"/>
+          </a:p>
+          <a:p>
+            <a:r>
+              <a:rPr lang="en-US" sz="1200" dirty="0" smtClean="0"/>
+              <a:t>The example demonstrates the use of APIs provided in PCIE LLD. This example does NOT work</a:t>
+            </a:r>
+          </a:p>
+          <a:p>
+            <a:r>
+              <a:rPr lang="en-US" sz="1200" dirty="0" smtClean="0"/>
+              <a:t>in the Shannon Simulator.</a:t>
+            </a:r>
+          </a:p>
+          <a:p>
+            <a:r>
+              <a:rPr lang="en-US" sz="1200" dirty="0" smtClean="0"/>
+              <a:t>Check the release notes for pre-requisites, tools and version information.</a:t>
+            </a:r>
+          </a:p>
+          <a:p>
+            <a:endParaRPr lang="en-US" sz="1200" dirty="0" smtClean="0"/>
+          </a:p>
+          <a:p>
+            <a:r>
+              <a:rPr lang="en-US" sz="1200" dirty="0" smtClean="0"/>
+              <a:t>------------------</a:t>
+            </a:r>
+          </a:p>
+          <a:p>
+            <a:r>
+              <a:rPr lang="en-US" sz="1200" dirty="0" smtClean="0"/>
+              <a:t>Example Overview</a:t>
+            </a:r>
+          </a:p>
+          <a:p>
+            <a:r>
+              <a:rPr lang="en-US" sz="1200" dirty="0" smtClean="0"/>
+              <a:t>------------------</a:t>
+            </a:r>
+          </a:p>
+          <a:p>
+            <a:endParaRPr lang="en-US" sz="1200" dirty="0" smtClean="0"/>
+          </a:p>
+          <a:p>
+            <a:r>
+              <a:rPr lang="en-US" sz="1200" dirty="0" smtClean="0"/>
+              <a:t>In the PCIe sample example two Shannon EVMs are used to test the PCIe driver. As described in the following figure, Shannon 1 is configured as a Root Complex and Shannon 2 is configured as End Point.</a:t>
+            </a:r>
+          </a:p>
+          <a:p>
+            <a:endParaRPr lang="en-US" sz="1200" dirty="0" smtClean="0"/>
+          </a:p>
+          <a:p>
+            <a:r>
+              <a:rPr lang="en-US" sz="1200" dirty="0" smtClean="0"/>
+              <a:t>       Shannon 1                                       Shannon 2</a:t>
+            </a:r>
+          </a:p>
+          <a:p>
+            <a:r>
+              <a:rPr lang="en-US" sz="1200" dirty="0" smtClean="0"/>
+              <a:t>   ------------------                             ------------------</a:t>
+            </a:r>
+          </a:p>
+          <a:p>
+            <a:r>
+              <a:rPr lang="en-US" sz="1200" dirty="0" smtClean="0"/>
+              <a:t>   |                |                             |                |</a:t>
+            </a:r>
+          </a:p>
+          <a:p>
+            <a:r>
+              <a:rPr lang="en-US" sz="1200" dirty="0" smtClean="0"/>
+              <a:t>   |   Root         |          PCIe Link          |  End Point     |</a:t>
+            </a:r>
+          </a:p>
+          <a:p>
+            <a:r>
+              <a:rPr lang="en-US" sz="1200" dirty="0" smtClean="0"/>
+              <a:t>   |   Complex      | &lt;--------------------------&gt;|                |</a:t>
+            </a:r>
+          </a:p>
+          <a:p>
+            <a:r>
+              <a:rPr lang="en-US" sz="1200" dirty="0" smtClean="0"/>
+              <a:t>   |                |                             |                |</a:t>
+            </a:r>
+          </a:p>
+          <a:p>
+            <a:r>
+              <a:rPr lang="en-US" sz="1200" dirty="0" smtClean="0"/>
+              <a:t>   ------------------                             ------------------</a:t>
+            </a:r>
+            <a:endParaRPr lang="en-US" sz="1200" dirty="0"/>
+          </a:p>
+        </p:txBody>
+      </p:sp>
+    </p:spTree>
+  </p:cSld>
+  <p:clrMapOvr>
+    <a:masterClrMapping/>
+  </p:clrMapOvr>
+</p:sld>
+</file>
+
+<file path=ppt/slides/slide23.xml><?xml version="1.0" encoding="utf-8"?>
+<p:sld xmlns:a="http://schemas.openxmlformats.org/drawingml/2006/main" xmlns:r="http://schemas.openxmlformats.org/officeDocument/2006/relationships" xmlns:p="http://schemas.openxmlformats.org/presentationml/2006/main">
+  <p:cSld>
+    <p:spTree>
+      <p:nvGrpSpPr>
+        <p:cNvPr id="1" name=""/>
+        <p:cNvGrpSpPr/>
+        <p:nvPr/>
+      </p:nvGrpSpPr>
+      <p:grpSpPr>
+        <a:xfrm>
+          <a:off x="0" y="0"/>
+          <a:ext cx="0" cy="0"/>
+          <a:chOff x="0" y="0"/>
+          <a:chExt cx="0" cy="0"/>
+        </a:xfrm>
+      </p:grpSpPr>
+      <p:sp>
+        <p:nvSpPr>
+          <p:cNvPr id="266242" name="Rectangle 2"/>
+          <p:cNvSpPr>
+            <a:spLocks noGrp="1" noChangeArrowheads="1"/>
+          </p:cNvSpPr>
+          <p:nvPr>
+            <p:ph type="title"/>
+          </p:nvPr>
+        </p:nvSpPr>
+        <p:spPr/>
+        <p:txBody>
+          <a:bodyPr/>
+          <a:lstStyle/>
+          <a:p>
+            <a:r>
+              <a:rPr lang="en-US" dirty="0" smtClean="0"/>
+              <a:t>Demo</a:t>
+            </a:r>
+            <a:endParaRPr lang="en-US" dirty="0"/>
+          </a:p>
+        </p:txBody>
+      </p:sp>
+      <p:sp>
+        <p:nvSpPr>
+          <p:cNvPr id="4" name="Rectangle 3"/>
+          <p:cNvSpPr/>
+          <p:nvPr/>
+        </p:nvSpPr>
+        <p:spPr>
+          <a:xfrm>
+            <a:off x="585216" y="1929384"/>
+            <a:ext cx="7680960" cy="3970318"/>
+          </a:xfrm>
+          <a:prstGeom prst="rect">
+            <a:avLst/>
+          </a:prstGeom>
+        </p:spPr>
+        <p:txBody>
+          <a:bodyPr wrap="square">
+            <a:spAutoFit/>
+          </a:bodyPr>
+          <a:lstStyle/>
+          <a:p>
+            <a:r>
+              <a:rPr lang="en-US" dirty="0" smtClean="0"/>
+              <a:t>At startup, each EVM configures its PCIe subsystem:</a:t>
+            </a:r>
+          </a:p>
+          <a:p>
+            <a:r>
+              <a:rPr lang="en-US" dirty="0" smtClean="0"/>
+              <a:t>• </a:t>
+            </a:r>
+            <a:r>
+              <a:rPr lang="en-US" dirty="0" err="1" smtClean="0"/>
+              <a:t>Serdes</a:t>
+            </a:r>
+            <a:r>
+              <a:rPr lang="en-US" dirty="0" smtClean="0"/>
+              <a:t>, clock, PLL</a:t>
+            </a:r>
+          </a:p>
+          <a:p>
+            <a:r>
+              <a:rPr lang="en-US" dirty="0" smtClean="0"/>
+              <a:t>• PCIe Mode and Power domain</a:t>
+            </a:r>
+          </a:p>
+          <a:p>
+            <a:r>
+              <a:rPr lang="en-US" dirty="0" smtClean="0"/>
+              <a:t>• Inbound/Outbound address translation and BAR registers</a:t>
+            </a:r>
+          </a:p>
+          <a:p>
+            <a:r>
+              <a:rPr lang="en-US" dirty="0" smtClean="0"/>
+              <a:t>• Link training is triggered</a:t>
+            </a:r>
+          </a:p>
+          <a:p>
+            <a:endParaRPr lang="en-US" dirty="0" smtClean="0"/>
+          </a:p>
+          <a:p>
+            <a:r>
+              <a:rPr lang="en-US" dirty="0" smtClean="0"/>
+              <a:t>Once the PCIe link is established, the following sequence of events will happen:</a:t>
+            </a:r>
+          </a:p>
+          <a:p>
+            <a:r>
+              <a:rPr lang="en-US" dirty="0" smtClean="0"/>
+              <a:t>• Shannon 1 sends data to Shannon 2</a:t>
+            </a:r>
+          </a:p>
+          <a:p>
+            <a:r>
+              <a:rPr lang="en-US" dirty="0" smtClean="0"/>
+              <a:t>• Shannon 2 waits to receive all the data</a:t>
+            </a:r>
+          </a:p>
+          <a:p>
+            <a:r>
+              <a:rPr lang="en-US" dirty="0" smtClean="0"/>
+              <a:t>• Shannon 2 sends the data back to Shannon 1</a:t>
+            </a:r>
+          </a:p>
+          <a:p>
+            <a:r>
+              <a:rPr lang="en-US" dirty="0" smtClean="0"/>
+              <a:t>• Shannon 1 waits to receive all the data</a:t>
+            </a:r>
+          </a:p>
+          <a:p>
+            <a:r>
+              <a:rPr lang="en-US" dirty="0" smtClean="0"/>
+              <a:t>• Shannon 1 verifies if the received data matches the sent data and declares test pass or fail.</a:t>
+            </a:r>
+            <a:endParaRPr lang="en-US" dirty="0"/>
+          </a:p>
+        </p:txBody>
+      </p:sp>
+    </p:spTree>
+  </p:cSld>
+  <p:clrMapOvr>
+    <a:masterClrMapping/>
+  </p:clrMapOvr>
+</p:sld>
+</file>
+
+<file path=ppt/slides/slide24.xml><?xml version="1.0" encoding="utf-8"?>
+<p:sld xmlns:a="http://schemas.openxmlformats.org/drawingml/2006/main" xmlns:r="http://schemas.openxmlformats.org/officeDocument/2006/relationships" xmlns:p="http://schemas.openxmlformats.org/presentationml/2006/main">
+  <p:cSld>
+    <p:spTree>
+      <p:nvGrpSpPr>
+        <p:cNvPr id="1" name=""/>
+        <p:cNvGrpSpPr/>
+        <p:nvPr/>
+      </p:nvGrpSpPr>
+      <p:grpSpPr>
+        <a:xfrm>
+          <a:off x="0" y="0"/>
+          <a:ext cx="0" cy="0"/>
+          <a:chOff x="0" y="0"/>
+          <a:chExt cx="0" cy="0"/>
+        </a:xfrm>
+      </p:grpSpPr>
+      <p:sp>
+        <p:nvSpPr>
+          <p:cNvPr id="266242" name="Rectangle 2"/>
+          <p:cNvSpPr>
+            <a:spLocks noGrp="1" noChangeArrowheads="1"/>
+          </p:cNvSpPr>
+          <p:nvPr>
+            <p:ph type="title"/>
+          </p:nvPr>
+        </p:nvSpPr>
+        <p:spPr/>
+        <p:txBody>
+          <a:bodyPr/>
+          <a:lstStyle/>
+          <a:p>
+            <a:r>
+              <a:rPr lang="en-US" dirty="0" smtClean="0"/>
+              <a:t>Demo</a:t>
+            </a:r>
+            <a:endParaRPr lang="en-US" dirty="0"/>
+          </a:p>
+        </p:txBody>
+      </p:sp>
+      <p:sp>
+        <p:nvSpPr>
+          <p:cNvPr id="5" name="Rectangle 4"/>
+          <p:cNvSpPr/>
+          <p:nvPr/>
+        </p:nvSpPr>
+        <p:spPr>
+          <a:xfrm>
+            <a:off x="621792" y="1892808"/>
+            <a:ext cx="7973568" cy="3970318"/>
+          </a:xfrm>
+          <a:prstGeom prst="rect">
+            <a:avLst/>
+          </a:prstGeom>
+        </p:spPr>
+        <p:txBody>
+          <a:bodyPr wrap="square">
+            <a:spAutoFit/>
+          </a:bodyPr>
+          <a:lstStyle/>
+          <a:p>
+            <a:r>
+              <a:rPr lang="en-US" dirty="0" smtClean="0"/>
+              <a:t>-------------------------</a:t>
+            </a:r>
+          </a:p>
+          <a:p>
+            <a:r>
+              <a:rPr lang="en-US" dirty="0" smtClean="0"/>
+              <a:t>Steps to run the example</a:t>
+            </a:r>
+          </a:p>
+          <a:p>
+            <a:r>
+              <a:rPr lang="en-US" dirty="0" smtClean="0"/>
+              <a:t>-------------------------</a:t>
+            </a:r>
+          </a:p>
+          <a:p>
+            <a:r>
+              <a:rPr lang="en-US" dirty="0" smtClean="0"/>
+              <a:t>1. Build the example</a:t>
+            </a:r>
+          </a:p>
+          <a:p>
+            <a:r>
+              <a:rPr lang="en-US" dirty="0" smtClean="0"/>
+              <a:t>2. Do a System Reset in both EVMs</a:t>
+            </a:r>
+          </a:p>
+          <a:p>
+            <a:r>
+              <a:rPr lang="en-US" dirty="0" smtClean="0"/>
+              <a:t>3. Load </a:t>
+            </a:r>
+            <a:r>
+              <a:rPr lang="en-US" dirty="0" err="1" smtClean="0"/>
+              <a:t>exampleProject.out</a:t>
+            </a:r>
+            <a:r>
+              <a:rPr lang="en-US" dirty="0" smtClean="0"/>
+              <a:t> in core zero in both EVMs</a:t>
+            </a:r>
+          </a:p>
+          <a:p>
+            <a:r>
+              <a:rPr lang="en-US" dirty="0" smtClean="0"/>
+              <a:t>4. In Shannon 1, use CCS watch window to modify the value of global</a:t>
+            </a:r>
+          </a:p>
+          <a:p>
+            <a:r>
+              <a:rPr lang="en-US" dirty="0" smtClean="0"/>
+              <a:t>   variable </a:t>
+            </a:r>
+            <a:r>
+              <a:rPr lang="en-US" dirty="0" err="1" smtClean="0"/>
+              <a:t>PcieModeGbl</a:t>
+            </a:r>
+            <a:r>
+              <a:rPr lang="en-US" dirty="0" smtClean="0"/>
+              <a:t>. In this example, Shannon 1 is a Root Complex,</a:t>
+            </a:r>
+          </a:p>
+          <a:p>
+            <a:r>
+              <a:rPr lang="en-US" dirty="0" smtClean="0"/>
+              <a:t>   therefore set </a:t>
+            </a:r>
+            <a:r>
+              <a:rPr lang="en-US" dirty="0" err="1" smtClean="0"/>
+              <a:t>PcieModeGbl</a:t>
+            </a:r>
+            <a:r>
+              <a:rPr lang="en-US" dirty="0" smtClean="0"/>
+              <a:t> to </a:t>
+            </a:r>
+            <a:r>
+              <a:rPr lang="en-US" dirty="0" err="1" smtClean="0"/>
+              <a:t>pcie_RC_MODE</a:t>
+            </a:r>
+            <a:r>
+              <a:rPr lang="en-US" dirty="0" smtClean="0"/>
+              <a:t> (this can be done through a drop down</a:t>
+            </a:r>
+          </a:p>
+          <a:p>
+            <a:r>
+              <a:rPr lang="en-US" dirty="0" smtClean="0"/>
+              <a:t>   menu in the watch window).</a:t>
+            </a:r>
+          </a:p>
+          <a:p>
+            <a:r>
+              <a:rPr lang="en-US" dirty="0" smtClean="0"/>
+              <a:t>5. Click the "Run" button in CCS for both EVMs (it is okay to have a few seconds between</a:t>
+            </a:r>
+          </a:p>
+          <a:p>
+            <a:r>
+              <a:rPr lang="en-US" dirty="0" smtClean="0"/>
+              <a:t>   the "Run" buttons are clicked in both sides).</a:t>
+            </a:r>
+            <a:endParaRPr lang="en-US" dirty="0"/>
+          </a:p>
+        </p:txBody>
+      </p:sp>
+    </p:spTree>
+  </p:cSld>
+  <p:clrMapOvr>
+    <a:masterClrMapping/>
+  </p:clrMapOvr>
+</p:sld>
+</file>
+
+<file path=ppt/slides/slide25.xml><?xml version="1.0" encoding="utf-8"?>
+<p:sld xmlns:a="http://schemas.openxmlformats.org/drawingml/2006/main" xmlns:r="http://schemas.openxmlformats.org/officeDocument/2006/relationships" xmlns:p="http://schemas.openxmlformats.org/presentationml/2006/main">
+  <p:cSld>
+    <p:spTree>
+      <p:nvGrpSpPr>
+        <p:cNvPr id="1" name=""/>
+        <p:cNvGrpSpPr/>
+        <p:nvPr/>
+      </p:nvGrpSpPr>
+      <p:grpSpPr>
+        <a:xfrm>
+          <a:off x="0" y="0"/>
+          <a:ext cx="0" cy="0"/>
+          <a:chOff x="0" y="0"/>
+          <a:chExt cx="0" cy="0"/>
+        </a:xfrm>
+      </p:grpSpPr>
+      <p:sp>
+        <p:nvSpPr>
+          <p:cNvPr id="266242" name="Rectangle 2"/>
+          <p:cNvSpPr>
+            <a:spLocks noGrp="1" noChangeArrowheads="1"/>
+          </p:cNvSpPr>
+          <p:nvPr>
+            <p:ph type="title"/>
+          </p:nvPr>
+        </p:nvSpPr>
+        <p:spPr/>
+        <p:txBody>
+          <a:bodyPr/>
+          <a:lstStyle/>
+          <a:p>
+            <a:r>
+              <a:rPr lang="en-US" dirty="0" smtClean="0"/>
+              <a:t>Demo</a:t>
+            </a:r>
+            <a:endParaRPr lang="en-US" dirty="0"/>
+          </a:p>
+        </p:txBody>
+      </p:sp>
+      <p:sp>
+        <p:nvSpPr>
+          <p:cNvPr id="4" name="Rectangle 3"/>
+          <p:cNvSpPr/>
+          <p:nvPr/>
+        </p:nvSpPr>
+        <p:spPr>
+          <a:xfrm>
+            <a:off x="548640" y="1582341"/>
+            <a:ext cx="8046720" cy="3139321"/>
+          </a:xfrm>
+          <a:prstGeom prst="rect">
+            <a:avLst/>
+          </a:prstGeom>
+        </p:spPr>
+        <p:txBody>
+          <a:bodyPr wrap="square">
+            <a:spAutoFit/>
+          </a:bodyPr>
+          <a:lstStyle/>
+          <a:p>
+            <a:r>
+              <a:rPr lang="en-US" dirty="0" smtClean="0"/>
+              <a:t>-------------------------</a:t>
+            </a:r>
+          </a:p>
+          <a:p>
+            <a:r>
+              <a:rPr lang="en-US" dirty="0" smtClean="0"/>
+              <a:t>Expected result</a:t>
+            </a:r>
+          </a:p>
+          <a:p>
+            <a:r>
+              <a:rPr lang="en-US" dirty="0" smtClean="0"/>
+              <a:t>-------------------------</a:t>
+            </a:r>
+          </a:p>
+          <a:p>
+            <a:r>
+              <a:rPr lang="en-US" dirty="0" smtClean="0"/>
+              <a:t>1. In Shannon 1 CCS console the status of the test will be updated. At the end, the message </a:t>
+            </a:r>
+          </a:p>
+          <a:p>
+            <a:r>
+              <a:rPr lang="en-US" dirty="0" smtClean="0"/>
+              <a:t>   "Test passed" is expected.</a:t>
+            </a:r>
+          </a:p>
+          <a:p>
+            <a:r>
+              <a:rPr lang="en-US" dirty="0" smtClean="0"/>
+              <a:t>2. In Shannon 2 CCS console the status of the test will be updated. At the end, the message </a:t>
+            </a:r>
+          </a:p>
+          <a:p>
+            <a:r>
+              <a:rPr lang="en-US" dirty="0" smtClean="0"/>
+              <a:t>   "End of test" is expected.</a:t>
+            </a:r>
+          </a:p>
+          <a:p>
+            <a:endParaRPr lang="en-US" dirty="0" smtClean="0"/>
+          </a:p>
+          <a:p>
+            <a:endParaRPr lang="en-US" dirty="0"/>
+          </a:p>
+        </p:txBody>
+      </p:sp>
+    </p:spTree>
+  </p:cSld>
+  <p:clrMapOvr>
+    <a:masterClrMapping/>
+  </p:clrMapOvr>
+</p:sld>
+</file>
+
+<file path=ppt/slides/slide26.xml><?xml version="1.0" encoding="utf-8"?>
 <p:sld xmlns:a="http://schemas.openxmlformats.org/drawingml/2006/main" xmlns:r="http://schemas.openxmlformats.org/officeDocument/2006/relationships" xmlns:p="http://schemas.openxmlformats.org/presentationml/2006/main">
   <p:cSld>
     <p:spTree>
@@ -7604,13 +8565,7 @@
               <a:rPr lang="en-US" altLang="zh-CN" dirty="0" smtClean="0">
                 <a:ea typeface="宋体" charset="-122"/>
               </a:rPr>
-              <a:t>PCIe </a:t>
-            </a:r>
-            <a:r>
-              <a:rPr lang="en-US" altLang="zh-CN" dirty="0" smtClean="0">
-                <a:ea typeface="宋体" charset="-122"/>
-              </a:rPr>
-              <a:t>Demo </a:t>
+              <a:t>PCIe Demo </a:t>
             </a:r>
             <a:endParaRPr lang="en-US" altLang="zh-CN" dirty="0">
               <a:ea typeface="宋体" charset="-122"/>

</xml_diff>

<commit_message>
Adding my understanding of the corrections that Eric Ding suggested after Xiaohui reported errors in the presentation
</commit_message>
<xml_diff>
--- a/slides/KeyStone PCI Express.pptx
+++ b/slides/KeyStone PCI Express.pptx
@@ -6538,8 +6538,13 @@
             <a:pPr lvl="1"/>
             <a:r>
               <a:rPr lang="en-US" sz="2000" dirty="0" smtClean="0"/>
-              <a:t>IB_BAR Inbound Translation Match Register (write the  MASK into IB_BAR, read gives the BAR set number)</a:t>
-            </a:r>
+              <a:t>IB_BAR Inbound Translation Match Register (write the  MASK into IB_BAR, read gives the BAR </a:t>
+            </a:r>
+            <a:r>
+              <a:rPr lang="en-US" sz="2000" dirty="0" smtClean="0"/>
+              <a:t>number to match the inbound translation)</a:t>
+            </a:r>
+            <a:endParaRPr lang="en-US" sz="2000" dirty="0" smtClean="0"/>
           </a:p>
           <a:p>
             <a:pPr lvl="1"/>
@@ -6559,11 +6564,12 @@
             <a:pPr lvl="1"/>
             <a:r>
               <a:rPr lang="en-US" sz="2000" dirty="0" smtClean="0"/>
-              <a:t>IB_OFFSET Inbound Translation device base address</a:t>
-            </a:r>
-          </a:p>
-          <a:p>
-            <a:pPr lvl="1"/>
+              <a:t>IB_OFFSET Inbound Translation device base </a:t>
+            </a:r>
+            <a:r>
+              <a:rPr lang="en-US" sz="2000" dirty="0" smtClean="0"/>
+              <a:t>address</a:t>
+            </a:r>
             <a:endParaRPr lang="en-US" sz="2000" dirty="0" smtClean="0"/>
           </a:p>
           <a:p>
@@ -6576,7 +6582,15 @@
             <a:pPr lvl="2"/>
             <a:r>
               <a:rPr lang="en-US" sz="1600" dirty="0" smtClean="0"/>
-              <a:t>Using a IB_BAR MASK register, A is compared with the low and high address to see if there is a match</a:t>
+              <a:t>Using a IB_BAR MASK register, A is compared with the low and high address </a:t>
+            </a:r>
+            <a:r>
+              <a:rPr lang="en-US" sz="1600" dirty="0" smtClean="0"/>
+              <a:t> of BAR 0-5 to </a:t>
+            </a:r>
+            <a:r>
+              <a:rPr lang="en-US" sz="1600" dirty="0" smtClean="0"/>
+              <a:t>see if there is a match</a:t>
             </a:r>
           </a:p>
           <a:p>
@@ -6599,7 +6613,28 @@
             </a:pPr>
             <a:r>
               <a:rPr lang="en-US" sz="1600" dirty="0" smtClean="0"/>
-              <a:t>The difference between A – IB_START (64 bit, high and low) is calculated</a:t>
+              <a:t>The first BAR number that covers A is determine, then look up in </a:t>
+            </a:r>
+            <a:r>
+              <a:rPr lang="en-US" sz="1600" dirty="0" err="1" smtClean="0"/>
+              <a:t>IB_BARn</a:t>
+            </a:r>
+            <a:r>
+              <a:rPr lang="en-US" sz="1600" dirty="0" smtClean="0"/>
+              <a:t> (0-3) to see which IB_BAR has this BAR number</a:t>
+            </a:r>
+          </a:p>
+          <a:p>
+            <a:pPr lvl="2">
+              <a:buNone/>
+            </a:pPr>
+            <a:r>
+              <a:rPr lang="en-US" sz="1600" dirty="0" smtClean="0"/>
+              <a:t>The </a:t>
+            </a:r>
+            <a:r>
+              <a:rPr lang="en-US" sz="1600" dirty="0" smtClean="0"/>
+              <a:t>difference between A – IB_START (64 bit, high and low) is calculated</a:t>
             </a:r>
           </a:p>
           <a:p>
@@ -6687,9 +6722,18 @@
           <a:lstStyle/>
           <a:p>
             <a:r>
-              <a:rPr lang="en-US" dirty="0"/>
-              <a:t>Example:</a:t>
-            </a:r>
+              <a:rPr lang="en-US" dirty="0" smtClean="0"/>
+              <a:t>Example </a:t>
+            </a:r>
+            <a:r>
+              <a:rPr lang="en-US" sz="2000" dirty="0" smtClean="0"/>
+              <a:t>(assume that BAR1 covers the inbound address)</a:t>
+            </a:r>
+            <a:r>
+              <a:rPr lang="en-US" dirty="0" smtClean="0"/>
+              <a:t>:</a:t>
+            </a:r>
+            <a:endParaRPr lang="en-US" dirty="0"/>
           </a:p>
           <a:p>
             <a:pPr lvl="1"/>
@@ -6900,7 +6944,25 @@
               <a:rPr lang="en-US" altLang="zh-CN" dirty="0" smtClean="0">
                 <a:ea typeface="宋体" charset="-122"/>
               </a:rPr>
-              <a:t> with the MASK (Read from  BAR 1) 0x000F FFFF gives 0xF740 0000.  Matches </a:t>
+              <a:t>(covered by BAR </a:t>
+            </a:r>
+            <a:r>
+              <a:rPr lang="en-US" altLang="zh-CN" dirty="0" smtClean="0">
+                <a:ea typeface="宋体" charset="-122"/>
+              </a:rPr>
+              <a:t>1</a:t>
+            </a:r>
+            <a:r>
+              <a:rPr lang="en-US" altLang="zh-CN" dirty="0" smtClean="0">
+                <a:ea typeface="宋体" charset="-122"/>
+              </a:rPr>
+              <a:t>) with the mask </a:t>
+            </a:r>
+            <a:r>
+              <a:rPr lang="en-US" altLang="zh-CN" dirty="0" smtClean="0">
+                <a:ea typeface="宋体" charset="-122"/>
+              </a:rPr>
+              <a:t>0x000F FFFF gives 0xF740 0000.  Matches </a:t>
             </a:r>
             <a:r>
               <a:rPr lang="en-US" altLang="zh-CN" dirty="0">
@@ -6918,8 +6980,17 @@
               <a:rPr lang="en-US" altLang="zh-CN" dirty="0">
                 <a:ea typeface="宋体" charset="-122"/>
               </a:rPr>
-              <a:t>it is accepted</a:t>
-            </a:r>
+              <a:t>it is </a:t>
+            </a:r>
+            <a:r>
+              <a:rPr lang="en-US" altLang="zh-CN" dirty="0" smtClean="0">
+                <a:ea typeface="宋体" charset="-122"/>
+              </a:rPr>
+              <a:t>accepted, BAR1 is inside IB_BAR0</a:t>
+            </a:r>
+            <a:endParaRPr lang="en-US" altLang="zh-CN" dirty="0">
+              <a:ea typeface="宋体" charset="-122"/>
+            </a:endParaRPr>
           </a:p>
           <a:p>
             <a:pPr lvl="2"/>
@@ -6953,7 +7024,19 @@
               <a:rPr lang="en-US" altLang="zh-CN" dirty="0" smtClean="0">
                 <a:ea typeface="宋体" charset="-122"/>
               </a:rPr>
-              <a:t>	0xF740_1234 &amp; 0x000F FFFF </a:t>
+              <a:t>	0xF740_1234 </a:t>
+            </a:r>
+            <a:r>
+              <a:rPr lang="en-US" altLang="zh-CN" dirty="0" smtClean="0">
+                <a:ea typeface="宋体" charset="-122"/>
+              </a:rPr>
+              <a:t>- </a:t>
+            </a:r>
+            <a:r>
+              <a:rPr lang="en-US" altLang="zh-CN" dirty="0" smtClean="0">
+                <a:ea typeface="宋体" charset="-122"/>
+              </a:rPr>
+              <a:t>0x000F FFFF </a:t>
             </a:r>
             <a:r>
               <a:rPr lang="en-US" altLang="zh-CN" dirty="0">
@@ -7707,11 +7790,7 @@
           <a:p>
             <a:r>
               <a:rPr lang="en-US" sz="2400" dirty="0" smtClean="0"/>
-              <a:t>C:\</a:t>
-            </a:r>
-            <a:r>
-              <a:rPr lang="en-US" sz="2400" dirty="0" smtClean="0"/>
-              <a:t>ti\pdk_C6678_xx_yy\packages\ti\drv\pcie\example\sample</a:t>
+              <a:t>C:\ti\pdk_C6678_xx_yy\packages\ti\drv\pcie\example\sample</a:t>
             </a:r>
           </a:p>
           <a:p>

</xml_diff>